<commit_message>
Last changes to presentation
</commit_message>
<xml_diff>
--- a/mmt30_hello_android.pptx
+++ b/mmt30_hello_android.pptx
@@ -5,7 +5,7 @@
     <p:sldMasterId id="2147483648" r:id="rId1"/>
   </p:sldMasterIdLst>
   <p:notesMasterIdLst>
-    <p:notesMasterId r:id="rId49"/>
+    <p:notesMasterId r:id="rId50"/>
   </p:notesMasterIdLst>
   <p:sldIdLst>
     <p:sldId id="258" r:id="rId2"/>
@@ -54,7 +54,8 @@
     <p:sldId id="316" r:id="rId45"/>
     <p:sldId id="317" r:id="rId46"/>
     <p:sldId id="318" r:id="rId47"/>
-    <p:sldId id="321" r:id="rId48"/>
+    <p:sldId id="322" r:id="rId48"/>
+    <p:sldId id="321" r:id="rId49"/>
   </p:sldIdLst>
   <p:sldSz cx="9144000" cy="6858000" type="screen4x3"/>
   <p:notesSz cx="7099300" cy="10234613"/>
@@ -9014,7 +9015,6 @@
               <a:rPr lang="de-DE" dirty="0"/>
               <a:t>-App</a:t>
             </a:r>
-            <a:endParaRPr lang="de-DE" dirty="0"/>
           </a:p>
         </p:txBody>
       </p:sp>
@@ -22364,7 +22364,7 @@
         </p:blipFill>
         <p:spPr>
           <a:xfrm>
-            <a:off x="2915816" y="1556793"/>
+            <a:off x="3548261" y="1556793"/>
             <a:ext cx="2232248" cy="3720414"/>
           </a:xfrm>
           <a:prstGeom prst="rect">
@@ -22425,7 +22425,7 @@
         </p:nvSpPr>
         <p:spPr>
           <a:xfrm>
-            <a:off x="2915816" y="5375473"/>
+            <a:off x="3548261" y="5367064"/>
             <a:ext cx="1944216" cy="607602"/>
           </a:xfrm>
           <a:prstGeom prst="rect">
@@ -22460,6 +22460,80 @@
             <a:r>
               <a:rPr lang="de-DE" dirty="0" smtClean="0"/>
               <a:t> 2.3.5</a:t>
+            </a:r>
+            <a:endParaRPr lang="de-DE" dirty="0"/>
+          </a:p>
+        </p:txBody>
+      </p:sp>
+      <p:pic>
+        <p:nvPicPr>
+          <p:cNvPr id="2" name="Grafik 1"/>
+          <p:cNvPicPr>
+            <a:picLocks noChangeAspect="1"/>
+          </p:cNvPicPr>
+          <p:nvPr/>
+        </p:nvPicPr>
+        <p:blipFill>
+          <a:blip r:embed="rId4" cstate="print">
+            <a:extLst>
+              <a:ext uri="{28A0092B-C50C-407E-A947-70E740481C1C}">
+                <a14:useLocalDpi xmlns:a14="http://schemas.microsoft.com/office/drawing/2010/main" val="0"/>
+              </a:ext>
+            </a:extLst>
+          </a:blip>
+          <a:stretch>
+            <a:fillRect/>
+          </a:stretch>
+        </p:blipFill>
+        <p:spPr>
+          <a:xfrm>
+            <a:off x="6516216" y="1550690"/>
+            <a:ext cx="2086330" cy="3709031"/>
+          </a:xfrm>
+          <a:prstGeom prst="rect">
+            <a:avLst/>
+          </a:prstGeom>
+        </p:spPr>
+      </p:pic>
+      <p:sp>
+        <p:nvSpPr>
+          <p:cNvPr id="10" name="Textfeld 9"/>
+          <p:cNvSpPr txBox="1"/>
+          <p:nvPr/>
+        </p:nvSpPr>
+        <p:spPr>
+          <a:xfrm>
+            <a:off x="6516216" y="5367064"/>
+            <a:ext cx="1656184" cy="607602"/>
+          </a:xfrm>
+          <a:prstGeom prst="rect">
+            <a:avLst/>
+          </a:prstGeom>
+          <a:noFill/>
+        </p:spPr>
+        <p:txBody>
+          <a:bodyPr wrap="square" rtlCol="0">
+            <a:spAutoFit/>
+          </a:bodyPr>
+          <a:lstStyle/>
+          <a:p>
+            <a:r>
+              <a:rPr lang="de-DE" dirty="0" err="1" smtClean="0"/>
+              <a:t>Galaxy</a:t>
+            </a:r>
+            <a:r>
+              <a:rPr lang="de-DE" dirty="0" smtClean="0"/>
+              <a:t> Nexus</a:t>
+            </a:r>
+          </a:p>
+          <a:p>
+            <a:r>
+              <a:rPr lang="de-DE" dirty="0" err="1" smtClean="0"/>
+              <a:t>Android</a:t>
+            </a:r>
+            <a:r>
+              <a:rPr lang="de-DE" dirty="0" smtClean="0"/>
+              <a:t> 4.0.4</a:t>
             </a:r>
             <a:endParaRPr lang="de-DE" dirty="0"/>
           </a:p>
@@ -22502,6 +22576,76 @@
           <a:chExt cx="0" cy="0"/>
         </a:xfrm>
       </p:grpSpPr>
+      <p:pic>
+        <p:nvPicPr>
+          <p:cNvPr id="6" name="Inhaltsplatzhalter 5"/>
+          <p:cNvPicPr>
+            <a:picLocks noGrp="1" noChangeAspect="1"/>
+          </p:cNvPicPr>
+          <p:nvPr>
+            <p:ph idx="1"/>
+          </p:nvPr>
+        </p:nvPicPr>
+        <p:blipFill>
+          <a:blip r:embed="rId2">
+            <a:extLst>
+              <a:ext uri="{28A0092B-C50C-407E-A947-70E740481C1C}">
+                <a14:useLocalDpi xmlns:a14="http://schemas.microsoft.com/office/drawing/2010/main" val="0"/>
+              </a:ext>
+            </a:extLst>
+          </a:blip>
+          <a:stretch>
+            <a:fillRect/>
+          </a:stretch>
+        </p:blipFill>
+        <p:spPr>
+          <a:xfrm>
+            <a:off x="899592" y="1412776"/>
+            <a:ext cx="7010400" cy="4381500"/>
+          </a:xfrm>
+        </p:spPr>
+      </p:pic>
+      <p:sp>
+        <p:nvSpPr>
+          <p:cNvPr id="3" name="Titel 2"/>
+          <p:cNvSpPr>
+            <a:spLocks noGrp="1"/>
+          </p:cNvSpPr>
+          <p:nvPr>
+            <p:ph type="title"/>
+          </p:nvPr>
+        </p:nvSpPr>
+        <p:spPr/>
+        <p:txBody>
+          <a:bodyPr/>
+          <a:lstStyle/>
+          <a:p>
+            <a:r>
+              <a:rPr lang="de-DE" dirty="0"/>
+              <a:t>Und wie sieht die App am Ende aus?</a:t>
+            </a:r>
+          </a:p>
+        </p:txBody>
+      </p:sp>
+      <p:sp>
+        <p:nvSpPr>
+          <p:cNvPr id="4" name="Untertitel 3"/>
+          <p:cNvSpPr>
+            <a:spLocks noGrp="1"/>
+          </p:cNvSpPr>
+          <p:nvPr>
+            <p:ph type="subTitle" idx="13"/>
+          </p:nvPr>
+        </p:nvSpPr>
+        <p:spPr/>
+        <p:txBody>
+          <a:bodyPr/>
+          <a:lstStyle/>
+          <a:p>
+            <a:endParaRPr lang="de-DE"/>
+          </a:p>
+        </p:txBody>
+      </p:sp>
       <p:sp>
         <p:nvSpPr>
           <p:cNvPr id="5" name="Foliennummernplatzhalter 4"/>
@@ -22521,6 +22665,114 @@
               <a:rPr lang="de-DE" smtClean="0"/>
               <a:pPr/>
               <a:t>47</a:t>
+            </a:fld>
+            <a:r>
+              <a:rPr lang="de-DE" smtClean="0"/>
+              <a:t>  </a:t>
+            </a:r>
+            <a:endParaRPr lang="de-DE" dirty="0"/>
+          </a:p>
+        </p:txBody>
+      </p:sp>
+      <p:sp>
+        <p:nvSpPr>
+          <p:cNvPr id="7" name="Textfeld 6"/>
+          <p:cNvSpPr txBox="1"/>
+          <p:nvPr/>
+        </p:nvSpPr>
+        <p:spPr>
+          <a:xfrm>
+            <a:off x="899592" y="5877272"/>
+            <a:ext cx="2736304" cy="607602"/>
+          </a:xfrm>
+          <a:prstGeom prst="rect">
+            <a:avLst/>
+          </a:prstGeom>
+          <a:noFill/>
+        </p:spPr>
+        <p:txBody>
+          <a:bodyPr wrap="square" rtlCol="0">
+            <a:spAutoFit/>
+          </a:bodyPr>
+          <a:lstStyle/>
+          <a:p>
+            <a:r>
+              <a:rPr lang="de-DE" dirty="0" err="1" smtClean="0"/>
+              <a:t>Acer</a:t>
+            </a:r>
+            <a:r>
+              <a:rPr lang="de-DE" dirty="0" smtClean="0"/>
+              <a:t> </a:t>
+            </a:r>
+            <a:r>
+              <a:rPr lang="de-DE" dirty="0" err="1" smtClean="0"/>
+              <a:t>Iconia</a:t>
+            </a:r>
+            <a:r>
+              <a:rPr lang="de-DE" dirty="0" smtClean="0"/>
+              <a:t> Tab A200 </a:t>
+            </a:r>
+            <a:r>
+              <a:rPr lang="de-DE" dirty="0" err="1" smtClean="0"/>
+              <a:t>Android</a:t>
+            </a:r>
+            <a:r>
+              <a:rPr lang="de-DE" dirty="0" smtClean="0"/>
+              <a:t> 4.0.4</a:t>
+            </a:r>
+            <a:endParaRPr lang="de-DE" dirty="0"/>
+          </a:p>
+        </p:txBody>
+      </p:sp>
+    </p:spTree>
+    <p:extLst>
+      <p:ext uri="{BB962C8B-B14F-4D97-AF65-F5344CB8AC3E}">
+        <p14:creationId xmlns:p14="http://schemas.microsoft.com/office/powerpoint/2010/main" val="2784877361"/>
+      </p:ext>
+    </p:extLst>
+  </p:cSld>
+  <p:clrMapOvr>
+    <a:masterClrMapping/>
+  </p:clrMapOvr>
+</p:sld>
+</file>
+
+<file path=ppt/slides/slide48.xml><?xml version="1.0" encoding="utf-8"?>
+<p:sld xmlns:a="http://schemas.openxmlformats.org/drawingml/2006/main" xmlns:r="http://schemas.openxmlformats.org/officeDocument/2006/relationships" xmlns:p="http://schemas.openxmlformats.org/presentationml/2006/main">
+  <p:cSld>
+    <p:spTree>
+      <p:nvGrpSpPr>
+        <p:cNvPr id="1" name=""/>
+        <p:cNvGrpSpPr/>
+        <p:nvPr/>
+      </p:nvGrpSpPr>
+      <p:grpSpPr>
+        <a:xfrm>
+          <a:off x="0" y="0"/>
+          <a:ext cx="0" cy="0"/>
+          <a:chOff x="0" y="0"/>
+          <a:chExt cx="0" cy="0"/>
+        </a:xfrm>
+      </p:grpSpPr>
+      <p:sp>
+        <p:nvSpPr>
+          <p:cNvPr id="5" name="Foliennummernplatzhalter 4"/>
+          <p:cNvSpPr>
+            <a:spLocks noGrp="1"/>
+          </p:cNvSpPr>
+          <p:nvPr>
+            <p:ph type="sldNum" idx="16"/>
+          </p:nvPr>
+        </p:nvSpPr>
+        <p:spPr/>
+        <p:txBody>
+          <a:bodyPr/>
+          <a:lstStyle/>
+          <a:p>
+            <a:fld id="{626F8DB4-595E-4F01-B61D-1BF02D8F1A74}" type="slidenum">
+              <a:rPr lang="de-DE" smtClean="0"/>
+              <a:pPr/>
+              <a:t>48</a:t>
             </a:fld>
             <a:r>
               <a:rPr lang="de-DE" smtClean="0"/>
@@ -23665,11 +23917,7 @@
           <a:p>
             <a:r>
               <a:rPr lang="de-DE" sz="1400" dirty="0" smtClean="0"/>
-              <a:t>Quelle: </a:t>
-            </a:r>
-            <a:r>
-              <a:rPr lang="de-DE" sz="1400" dirty="0" smtClean="0"/>
-              <a:t>developer.android.com</a:t>
+              <a:t>Quelle: developer.android.com</a:t>
             </a:r>
             <a:endParaRPr lang="de-DE" sz="1400" dirty="0"/>
           </a:p>

</xml_diff>